<commit_message>
Final changes presentation and handout
</commit_message>
<xml_diff>
--- a/Presentation/Abstract_Factory.pptx
+++ b/Presentation/Abstract_Factory.pptx
@@ -274,6 +274,9 @@
     <p:ext uri="{EFAFB233-063F-42B5-8137-9DF3F51BA10A}">
       <p15:sldGuideLst xmlns:p15="http://schemas.microsoft.com/office/powerpoint/2012/main"/>
     </p:ext>
+    <p:ext uri="{2D200454-40CA-4A62-9FC3-DE9A4176ACB9}">
+      <p15:notesGuideLst xmlns:p15="http://schemas.microsoft.com/office/powerpoint/2012/main"/>
+    </p:ext>
   </p:extLst>
 </p:presentation>
 </file>
@@ -372,7 +375,7 @@
           <a:p>
             <a:fld id="{3AC32170-C98A-4426-A5C7-F71975255C42}" type="datetimeFigureOut">
               <a:rPr lang="de-AT" smtClean="0"/>
-              <a:t>14.03.2019</a:t>
+              <a:t>16.03.2019</a:t>
             </a:fld>
             <a:endParaRPr lang="de-AT"/>
           </a:p>
@@ -1681,7 +1684,7 @@
               </a:spcAft>
               <a:buSzPts val="3000"/>
               <a:buChar char="▪"/>
-              <a:defRPr/>
+              <a:defRPr sz="2400"/>
             </a:lvl1pPr>
             <a:lvl2pPr marL="914400" lvl="1" indent="-381000">
               <a:spcBef>
@@ -1773,7 +1776,7 @@
             </a:lvl9pPr>
           </a:lstStyle>
           <a:p>
-            <a:endParaRPr/>
+            <a:endParaRPr dirty="0"/>
           </a:p>
         </p:txBody>
       </p:sp>
@@ -3503,66 +3506,108 @@
           <a:bodyPr/>
           <a:lstStyle/>
           <a:p>
-            <a:r>
-              <a:rPr lang="de-AT" dirty="0"/>
-              <a:t>Interface für konkrete Klassen</a:t>
-            </a:r>
-          </a:p>
-          <a:p>
-            <a:r>
-              <a:rPr lang="de-AT" dirty="0"/>
-              <a:t>Konkrete Klassen, die das Interface implementieren</a:t>
-            </a:r>
-          </a:p>
-          <a:p>
-            <a:r>
-              <a:rPr lang="de-AT" dirty="0"/>
-              <a:t>Abstract Factory</a:t>
-            </a:r>
-            <a:endParaRPr lang="de-AT" dirty="0">
-              <a:sym typeface="Wingdings" panose="05000000000000000000" pitchFamily="2" charset="2"/>
-            </a:endParaRPr>
-          </a:p>
-          <a:p>
-            <a:r>
-              <a:rPr lang="de-AT" dirty="0">
-                <a:sym typeface="Wingdings" panose="05000000000000000000" pitchFamily="2" charset="2"/>
-              </a:rPr>
-              <a:t>Konkrete </a:t>
-            </a:r>
-            <a:r>
-              <a:rPr lang="de-AT" dirty="0" err="1">
-                <a:sym typeface="Wingdings" panose="05000000000000000000" pitchFamily="2" charset="2"/>
-              </a:rPr>
+            <a:pPr lvl="0"/>
+            <a:r>
+              <a:rPr lang="de-AT" dirty="0"/>
+              <a:t>Factory</a:t>
+            </a:r>
+            <a:endParaRPr lang="de-AT" sz="2000" dirty="0"/>
+          </a:p>
+          <a:p>
+            <a:pPr lvl="1"/>
+            <a:r>
+              <a:rPr lang="de-AT" dirty="0"/>
+              <a:t>Interface </a:t>
+            </a:r>
+            <a:r>
+              <a:rPr lang="de-AT" dirty="0" err="1"/>
+              <a:t>AbstractFactory</a:t>
+            </a:r>
+            <a:endParaRPr lang="de-AT" sz="2000" dirty="0"/>
+          </a:p>
+          <a:p>
+            <a:pPr lvl="1"/>
+            <a:r>
+              <a:rPr lang="en-GB" dirty="0" err="1"/>
+              <a:t>Konkrete</a:t>
+            </a:r>
+            <a:r>
+              <a:rPr lang="en-GB" dirty="0"/>
+              <a:t> Factory – </a:t>
+            </a:r>
+            <a:r>
+              <a:rPr lang="en-GB" dirty="0" err="1"/>
+              <a:t>implementiert</a:t>
+            </a:r>
+            <a:r>
+              <a:rPr lang="en-GB" dirty="0"/>
+              <a:t> Abstract Factory (</a:t>
+            </a:r>
+            <a:r>
+              <a:rPr lang="en-GB" dirty="0" err="1"/>
+              <a:t>VehicleFactory</a:t>
+            </a:r>
+            <a:r>
+              <a:rPr lang="en-GB" dirty="0"/>
+              <a:t> implements </a:t>
+            </a:r>
+            <a:r>
+              <a:rPr lang="en-GB" dirty="0" err="1"/>
+              <a:t>AbstractFactory</a:t>
+            </a:r>
+            <a:r>
+              <a:rPr lang="en-GB" dirty="0"/>
+              <a:t>)</a:t>
+            </a:r>
+            <a:endParaRPr lang="de-AT" sz="2000" dirty="0"/>
+          </a:p>
+          <a:p>
+            <a:pPr lvl="0"/>
+            <a:r>
+              <a:rPr lang="de-AT" dirty="0"/>
+              <a:t>Zu erzeugende Objekte</a:t>
+            </a:r>
+            <a:endParaRPr lang="de-AT" sz="2000" dirty="0"/>
+          </a:p>
+          <a:p>
+            <a:pPr lvl="1"/>
+            <a:r>
+              <a:rPr lang="de-AT" dirty="0"/>
+              <a:t>Interface mit gemeinsamen Eigenschaften (Vehicle)</a:t>
+            </a:r>
+            <a:endParaRPr lang="de-AT" sz="2000" dirty="0"/>
+          </a:p>
+          <a:p>
+            <a:pPr lvl="1"/>
+            <a:r>
+              <a:rPr lang="de-AT" dirty="0"/>
+              <a:t>Konkrete Klassen – implementieren Interface (Car </a:t>
+            </a:r>
+            <a:r>
+              <a:rPr lang="de-AT" dirty="0" err="1"/>
+              <a:t>implements</a:t>
+            </a:r>
+            <a:r>
+              <a:rPr lang="de-AT" dirty="0"/>
+              <a:t> Vehicle)</a:t>
+            </a:r>
+            <a:endParaRPr lang="de-AT" sz="2000" dirty="0"/>
+          </a:p>
+          <a:p>
+            <a:pPr lvl="0"/>
+            <a:r>
+              <a:rPr lang="de-AT" dirty="0"/>
+              <a:t>Optional: Factory Producer, der die abstrakten </a:t>
+            </a:r>
+            <a:r>
+              <a:rPr lang="de-AT" dirty="0" err="1"/>
               <a:t>Factories</a:t>
             </a:r>
             <a:r>
-              <a:rPr lang="de-AT" dirty="0">
-                <a:sym typeface="Wingdings" panose="05000000000000000000" pitchFamily="2" charset="2"/>
-              </a:rPr>
-              <a:t>, die von abstrakter Factory abgeleitet sind</a:t>
-            </a:r>
-          </a:p>
-          <a:p>
-            <a:r>
-              <a:rPr lang="de-AT" dirty="0">
-                <a:sym typeface="Wingdings" panose="05000000000000000000" pitchFamily="2" charset="2"/>
-              </a:rPr>
-              <a:t>Optional: Factory Producer, der abstrakte </a:t>
-            </a:r>
-            <a:r>
-              <a:rPr lang="de-AT" dirty="0" err="1">
-                <a:sym typeface="Wingdings" panose="05000000000000000000" pitchFamily="2" charset="2"/>
-              </a:rPr>
-              <a:t>Factories</a:t>
-            </a:r>
-            <a:r>
-              <a:rPr lang="de-AT" dirty="0">
-                <a:sym typeface="Wingdings" panose="05000000000000000000" pitchFamily="2" charset="2"/>
-              </a:rPr>
+              <a:rPr lang="de-AT" dirty="0"/>
               <a:t> erzeugt</a:t>
             </a:r>
-            <a:endParaRPr lang="de-AT" dirty="0"/>
+            <a:endParaRPr lang="de-AT" sz="2000" dirty="0"/>
           </a:p>
         </p:txBody>
       </p:sp>
@@ -4971,7 +5016,7 @@
             </a:pPr>
             <a:r>
               <a:rPr lang="de-AT" dirty="0"/>
-              <a:t>Stelle ein Interface für die Erzeugung von Gruppen von ähnlichen oder abhängigen bereit, ohne dabei die konkreten Klassen zu spezifizieren</a:t>
+              <a:t>Stelle ein Interface für die Erzeugung von Gruppen von ähnlichen oder abhängigen Objekten bereit, ohne dabei die konkreten Klassen zu spezifizieren</a:t>
             </a:r>
           </a:p>
         </p:txBody>
@@ -5130,7 +5175,15 @@
             <a:pPr lvl="1"/>
             <a:r>
               <a:rPr lang="de-AT" dirty="0"/>
-              <a:t>Abstract Factory erzeugt Factory, die das Objekt erzeugen kann</a:t>
+              <a:t>Konkrete </a:t>
+            </a:r>
+            <a:r>
+              <a:rPr lang="de-AT" dirty="0" err="1"/>
+              <a:t>Factories</a:t>
+            </a:r>
+            <a:r>
+              <a:rPr lang="de-AT" dirty="0"/>
+              <a:t> hinter abstrakter Factory</a:t>
             </a:r>
           </a:p>
           <a:p>
@@ -5605,7 +5658,7 @@
             </a:r>
             <a:r>
               <a:rPr lang="de-AT" dirty="0"/>
-              <a:t> zum Erzeugen des Layouts (horizontale oder vertikale Orientierung)</a:t>
+              <a:t> zum Erzeugen des Layouts der Komponenten (horizontale oder vertikale Orientierung)</a:t>
             </a:r>
           </a:p>
         </p:txBody>
@@ -5798,6 +5851,12 @@
               <a:t>Baumeditor, Spreadsheets, CASE-Tools, … </a:t>
             </a:r>
           </a:p>
+          <a:p>
+            <a:r>
+              <a:rPr lang="de-AT" dirty="0"/>
+              <a:t>Abstract Factory zur Portabilität zwischen Fenstersystemen</a:t>
+            </a:r>
+          </a:p>
         </p:txBody>
       </p:sp>
       <p:sp>
@@ -6027,7 +6086,7 @@
             <a:pPr lvl="1"/>
             <a:r>
               <a:rPr lang="de-AT" dirty="0"/>
-              <a:t>Factory erzeugt konkrete Klassen</a:t>
+              <a:t>Factory erzeugt konkrete Objekte</a:t>
             </a:r>
           </a:p>
           <a:p>

</xml_diff>

<commit_message>
Presentation and Handout adjustments
</commit_message>
<xml_diff>
--- a/Presentation/Abstract_Factory.pptx
+++ b/Presentation/Abstract_Factory.pptx
@@ -4165,7 +4165,12 @@
             <p:ph type="body" idx="1"/>
           </p:nvPr>
         </p:nvSpPr>
-        <p:spPr/>
+        <p:spPr>
+          <a:xfrm>
+            <a:off x="343225" y="1411220"/>
+            <a:ext cx="8290800" cy="4851900"/>
+          </a:xfrm>
+        </p:spPr>
         <p:txBody>
           <a:bodyPr/>
           <a:lstStyle/>
@@ -4248,6 +4253,15 @@
                 <a:sym typeface="Wingdings" panose="05000000000000000000" pitchFamily="2" charset="2"/>
               </a:rPr>
               <a:t> Aufteilung | Anti-pattern  Ein Objekt, das alle Aufgaben übernimmt</a:t>
+            </a:r>
+          </a:p>
+          <a:p>
+            <a:pPr lvl="1"/>
+            <a:r>
+              <a:rPr lang="de-AT" dirty="0">
+                <a:sym typeface="Wingdings" panose="05000000000000000000" pitchFamily="2" charset="2"/>
+              </a:rPr>
+              <a:t>Bei nur einer Implementierung des Interfaces  unnötige Komplexität</a:t>
             </a:r>
             <a:endParaRPr lang="de-AT" dirty="0"/>
           </a:p>

</xml_diff>